<commit_message>
Updated architecture with IP of the ASE
</commit_message>
<xml_diff>
--- a/images/diagram.pptx
+++ b/images/diagram.pptx
@@ -104,7 +104,16 @@
       </a:defRPr>
     </a:lvl9pPr>
   </p:defaultTextStyle>
+  <p:extLst>
+    <p:ext uri="{EFAFB233-063F-42B5-8137-9DF3F51BA10A}">
+      <p15:sldGuideLst xmlns:p15="http://schemas.microsoft.com/office/powerpoint/2012/main"/>
+    </p:ext>
+  </p:extLst>
 </p:presentation>
+</file>
+
+<file path=ppt/revisionInfo.xml><?xml version="1.0" encoding="utf-8"?>
+<p1510:revInfo xmlns:a="http://schemas.openxmlformats.org/drawingml/2006/main" xmlns:r="http://schemas.openxmlformats.org/officeDocument/2006/relationships" xmlns:p1510="http://schemas.microsoft.com/office/powerpoint/2015/10/main"/>
 </file>
 
 <file path=ppt/slideLayouts/slideLayout1.xml><?xml version="1.0" encoding="utf-8"?>
@@ -3961,9 +3970,9 @@
         <p:grpSpPr>
           <a:xfrm>
             <a:off x="1330453" y="8925634"/>
-            <a:ext cx="1969033" cy="646331"/>
+            <a:ext cx="1969033" cy="784830"/>
             <a:chOff x="9042351" y="3160518"/>
-            <a:chExt cx="1969033" cy="646331"/>
+            <a:chExt cx="1969033" cy="784830"/>
           </a:xfrm>
         </p:grpSpPr>
         <p:pic>
@@ -4017,7 +4026,7 @@
           <p:spPr>
             <a:xfrm>
               <a:off x="9452944" y="3160518"/>
-              <a:ext cx="1558440" cy="646331"/>
+              <a:ext cx="1558440" cy="784830"/>
             </a:xfrm>
             <a:prstGeom prst="rect">
               <a:avLst/>
@@ -4149,6 +4158,63 @@
                 </a:rPr>
                 <a:t>internal.yourdomain.com</a:t>
               </a:r>
+              <a:br>
+                <a:rPr kumimoji="0" lang="en-US" sz="900" b="0" i="0" u="none" strike="noStrike" kern="1200" cap="none" spc="0" normalizeH="0" baseline="0" noProof="0" dirty="0">
+                  <a:ln>
+                    <a:noFill/>
+                  </a:ln>
+                  <a:solidFill>
+                    <a:prstClr val="black"/>
+                  </a:solidFill>
+                  <a:effectLst/>
+                  <a:uLnTx/>
+                  <a:uFillTx/>
+                  <a:latin typeface="Segoe UI" panose="020B0502040204020203" pitchFamily="34" charset="0"/>
+                  <a:ea typeface="+mn-ea"/>
+                  <a:cs typeface="Segoe UI" panose="020B0502040204020203" pitchFamily="34" charset="0"/>
+                </a:rPr>
+              </a:br>
+              <a:r>
+                <a:rPr kumimoji="0" lang="en-US" sz="900" b="0" i="0" u="none" strike="noStrike" kern="1200" cap="none" spc="0" normalizeH="0" baseline="0" noProof="0" dirty="0">
+                  <a:ln>
+                    <a:noFill/>
+                  </a:ln>
+                  <a:solidFill>
+                    <a:prstClr val="black"/>
+                  </a:solidFill>
+                  <a:effectLst/>
+                  <a:uLnTx/>
+                  <a:uFillTx/>
+                  <a:latin typeface="Segoe UI" panose="020B0502040204020203" pitchFamily="34" charset="0"/>
+                  <a:ea typeface="+mn-ea"/>
+                  <a:cs typeface="Segoe UI" panose="020B0502040204020203" pitchFamily="34" charset="0"/>
+                </a:rPr>
+                <a:t>IP: </a:t>
+              </a:r>
+              <a:r>
+                <a:rPr lang="en-US" sz="900" dirty="0">
+                  <a:solidFill>
+                    <a:prstClr val="black"/>
+                  </a:solidFill>
+                  <a:latin typeface="Segoe UI" panose="020B0502040204020203" pitchFamily="34" charset="0"/>
+                  <a:cs typeface="Segoe UI" panose="020B0502040204020203" pitchFamily="34" charset="0"/>
+                </a:rPr>
+                <a:t>10.0.3.9</a:t>
+              </a:r>
+              <a:endParaRPr kumimoji="0" lang="en-US" sz="900" b="0" i="0" u="none" strike="noStrike" kern="1200" cap="none" spc="0" normalizeH="0" baseline="0" noProof="0" dirty="0">
+                <a:ln>
+                  <a:noFill/>
+                </a:ln>
+                <a:solidFill>
+                  <a:prstClr val="black"/>
+                </a:solidFill>
+                <a:effectLst/>
+                <a:uLnTx/>
+                <a:uFillTx/>
+                <a:latin typeface="Segoe UI" panose="020B0502040204020203" pitchFamily="34" charset="0"/>
+                <a:ea typeface="+mn-ea"/>
+                <a:cs typeface="Segoe UI" panose="020B0502040204020203" pitchFamily="34" charset="0"/>
+              </a:endParaRPr>
             </a:p>
           </p:txBody>
         </p:sp>

</xml_diff>

<commit_message>
Updated scripts and templates
</commit_message>
<xml_diff>
--- a/images/diagram.pptx
+++ b/images/diagram.pptx
@@ -247,7 +247,7 @@
           <a:p>
             <a:fld id="{85932DBE-ED53-4F32-A009-03A86D5F7F5D}" type="datetimeFigureOut">
               <a:rPr lang="en-US" smtClean="0"/>
-              <a:t>7/5/2017</a:t>
+              <a:t>16/5/2017</a:t>
             </a:fld>
             <a:endParaRPr lang="en-US"/>
           </a:p>
@@ -417,7 +417,7 @@
           <a:p>
             <a:fld id="{85932DBE-ED53-4F32-A009-03A86D5F7F5D}" type="datetimeFigureOut">
               <a:rPr lang="en-US" smtClean="0"/>
-              <a:t>7/5/2017</a:t>
+              <a:t>16/5/2017</a:t>
             </a:fld>
             <a:endParaRPr lang="en-US"/>
           </a:p>
@@ -597,7 +597,7 @@
           <a:p>
             <a:fld id="{85932DBE-ED53-4F32-A009-03A86D5F7F5D}" type="datetimeFigureOut">
               <a:rPr lang="en-US" smtClean="0"/>
-              <a:t>7/5/2017</a:t>
+              <a:t>16/5/2017</a:t>
             </a:fld>
             <a:endParaRPr lang="en-US"/>
           </a:p>
@@ -767,7 +767,7 @@
           <a:p>
             <a:fld id="{85932DBE-ED53-4F32-A009-03A86D5F7F5D}" type="datetimeFigureOut">
               <a:rPr lang="en-US" smtClean="0"/>
-              <a:t>7/5/2017</a:t>
+              <a:t>16/5/2017</a:t>
             </a:fld>
             <a:endParaRPr lang="en-US"/>
           </a:p>
@@ -1011,7 +1011,7 @@
           <a:p>
             <a:fld id="{85932DBE-ED53-4F32-A009-03A86D5F7F5D}" type="datetimeFigureOut">
               <a:rPr lang="en-US" smtClean="0"/>
-              <a:t>7/5/2017</a:t>
+              <a:t>16/5/2017</a:t>
             </a:fld>
             <a:endParaRPr lang="en-US"/>
           </a:p>
@@ -1243,7 +1243,7 @@
           <a:p>
             <a:fld id="{85932DBE-ED53-4F32-A009-03A86D5F7F5D}" type="datetimeFigureOut">
               <a:rPr lang="en-US" smtClean="0"/>
-              <a:t>7/5/2017</a:t>
+              <a:t>16/5/2017</a:t>
             </a:fld>
             <a:endParaRPr lang="en-US"/>
           </a:p>
@@ -1610,7 +1610,7 @@
           <a:p>
             <a:fld id="{85932DBE-ED53-4F32-A009-03A86D5F7F5D}" type="datetimeFigureOut">
               <a:rPr lang="en-US" smtClean="0"/>
-              <a:t>7/5/2017</a:t>
+              <a:t>16/5/2017</a:t>
             </a:fld>
             <a:endParaRPr lang="en-US"/>
           </a:p>
@@ -1728,7 +1728,7 @@
           <a:p>
             <a:fld id="{85932DBE-ED53-4F32-A009-03A86D5F7F5D}" type="datetimeFigureOut">
               <a:rPr lang="en-US" smtClean="0"/>
-              <a:t>7/5/2017</a:t>
+              <a:t>16/5/2017</a:t>
             </a:fld>
             <a:endParaRPr lang="en-US"/>
           </a:p>
@@ -1823,7 +1823,7 @@
           <a:p>
             <a:fld id="{85932DBE-ED53-4F32-A009-03A86D5F7F5D}" type="datetimeFigureOut">
               <a:rPr lang="en-US" smtClean="0"/>
-              <a:t>7/5/2017</a:t>
+              <a:t>16/5/2017</a:t>
             </a:fld>
             <a:endParaRPr lang="en-US"/>
           </a:p>
@@ -2100,7 +2100,7 @@
           <a:p>
             <a:fld id="{85932DBE-ED53-4F32-A009-03A86D5F7F5D}" type="datetimeFigureOut">
               <a:rPr lang="en-US" smtClean="0"/>
-              <a:t>7/5/2017</a:t>
+              <a:t>16/5/2017</a:t>
             </a:fld>
             <a:endParaRPr lang="en-US"/>
           </a:p>
@@ -2357,7 +2357,7 @@
           <a:p>
             <a:fld id="{85932DBE-ED53-4F32-A009-03A86D5F7F5D}" type="datetimeFigureOut">
               <a:rPr lang="en-US" smtClean="0"/>
-              <a:t>7/5/2017</a:t>
+              <a:t>16/5/2017</a:t>
             </a:fld>
             <a:endParaRPr lang="en-US"/>
           </a:p>
@@ -2570,7 +2570,7 @@
           <a:p>
             <a:fld id="{85932DBE-ED53-4F32-A009-03A86D5F7F5D}" type="datetimeFigureOut">
               <a:rPr lang="en-US" smtClean="0"/>
-              <a:t>7/5/2017</a:t>
+              <a:t>16/5/2017</a:t>
             </a:fld>
             <a:endParaRPr lang="en-US"/>
           </a:p>
@@ -3025,7 +3025,7 @@
           <a:lstStyle/>
           <a:p>
             <a:pPr algn="ctr"/>
-            <a:endParaRPr lang="en-US"/>
+            <a:endParaRPr lang="en-US" dirty="0"/>
           </a:p>
         </p:txBody>
       </p:sp>
@@ -5535,10 +5535,10 @@
         </p:nvGrpSpPr>
         <p:grpSpPr>
           <a:xfrm>
-            <a:off x="5906363" y="8434605"/>
-            <a:ext cx="1449492" cy="476250"/>
+            <a:off x="5906363" y="8422413"/>
+            <a:ext cx="1969668" cy="499735"/>
             <a:chOff x="4534410" y="264154"/>
-            <a:chExt cx="1449492" cy="476250"/>
+            <a:chExt cx="1969668" cy="499735"/>
           </a:xfrm>
         </p:grpSpPr>
         <p:pic>
@@ -5591,8 +5591,8 @@
           </p:nvSpPr>
           <p:spPr>
             <a:xfrm>
-              <a:off x="4983554" y="317613"/>
-              <a:ext cx="1000348" cy="369332"/>
+              <a:off x="4983553" y="317613"/>
+              <a:ext cx="1520525" cy="446276"/>
             </a:xfrm>
             <a:prstGeom prst="rect">
               <a:avLst/>
@@ -5631,14 +5631,33 @@
                 <a:defRPr/>
               </a:pPr>
               <a:r>
-                <a:rPr lang="en-US" sz="900" dirty="0">
+                <a:rPr lang="en-US" sz="700" dirty="0">
                   <a:solidFill>
                     <a:prstClr val="black"/>
                   </a:solidFill>
                   <a:latin typeface="Segoe UI" panose="020B0502040204020203" pitchFamily="34" charset="0"/>
                   <a:cs typeface="Segoe UI" panose="020B0502040204020203" pitchFamily="34" charset="0"/>
                 </a:rPr>
-                <a:t>Multiple SANs</a:t>
+                <a:t>Subject=*.internal.domain.com</a:t>
+              </a:r>
+              <a:br>
+                <a:rPr lang="en-US" sz="700" dirty="0">
+                  <a:solidFill>
+                    <a:prstClr val="black"/>
+                  </a:solidFill>
+                  <a:latin typeface="Segoe UI" panose="020B0502040204020203" pitchFamily="34" charset="0"/>
+                  <a:cs typeface="Segoe UI" panose="020B0502040204020203" pitchFamily="34" charset="0"/>
+                </a:rPr>
+              </a:br>
+              <a:r>
+                <a:rPr lang="en-US" sz="700" dirty="0">
+                  <a:solidFill>
+                    <a:prstClr val="black"/>
+                  </a:solidFill>
+                  <a:latin typeface="Segoe UI" panose="020B0502040204020203" pitchFamily="34" charset="0"/>
+                  <a:cs typeface="Segoe UI" panose="020B0502040204020203" pitchFamily="34" charset="0"/>
+                </a:rPr>
+                <a:t>SAN=*.scm.internal.domain.com</a:t>
               </a:r>
             </a:p>
           </p:txBody>
@@ -6674,14 +6693,12 @@
           </p:cNvPr>
           <p:cNvCxnSpPr>
             <a:cxnSpLocks/>
-            <a:stCxn id="100" idx="3"/>
-            <a:endCxn id="102" idx="2"/>
           </p:cNvCxnSpPr>
           <p:nvPr/>
         </p:nvCxnSpPr>
         <p:spPr>
           <a:xfrm flipV="1">
-            <a:off x="4669105" y="8910855"/>
+            <a:off x="4669105" y="8923047"/>
             <a:ext cx="1475383" cy="441471"/>
           </a:xfrm>
           <a:prstGeom prst="bentConnector2">
@@ -7229,6 +7246,498 @@
             </a:solidFill>
             <a:headEnd type="oval" w="sm" len="sm"/>
             <a:tailEnd type="oval" w="sm" len="sm"/>
+          </a:ln>
+        </p:spPr>
+        <p:style>
+          <a:lnRef idx="1">
+            <a:schemeClr val="accent1"/>
+          </a:lnRef>
+          <a:fillRef idx="0">
+            <a:schemeClr val="accent1"/>
+          </a:fillRef>
+          <a:effectRef idx="0">
+            <a:schemeClr val="accent1"/>
+          </a:effectRef>
+          <a:fontRef idx="minor">
+            <a:schemeClr val="tx1"/>
+          </a:fontRef>
+        </p:style>
+      </p:cxnSp>
+      <p:cxnSp>
+        <p:nvCxnSpPr>
+          <p:cNvPr id="120" name="Straight Connector 127">
+            <a:extLst>
+              <a:ext uri="{FF2B5EF4-FFF2-40B4-BE49-F238E27FC236}">
+                <a16:creationId xmlns:a16="http://schemas.microsoft.com/office/drawing/2014/main" id="{BED8FA5A-FEDD-46C1-8247-8FB1A4EAA593}"/>
+              </a:ext>
+            </a:extLst>
+          </p:cNvPr>
+          <p:cNvCxnSpPr>
+            <a:cxnSpLocks/>
+          </p:cNvCxnSpPr>
+          <p:nvPr/>
+        </p:nvCxnSpPr>
+        <p:spPr>
+          <a:xfrm rot="10800000">
+            <a:off x="2428775" y="6187445"/>
+            <a:ext cx="667559" cy="900787"/>
+          </a:xfrm>
+          <a:prstGeom prst="bentConnector2">
+            <a:avLst/>
+          </a:prstGeom>
+          <a:ln w="38100">
+            <a:solidFill>
+              <a:srgbClr val="FF8C00"/>
+            </a:solidFill>
+            <a:headEnd type="oval" w="sm" len="sm"/>
+            <a:tailEnd type="oval" w="sm" len="sm"/>
+          </a:ln>
+        </p:spPr>
+        <p:style>
+          <a:lnRef idx="1">
+            <a:schemeClr val="accent1"/>
+          </a:lnRef>
+          <a:fillRef idx="0">
+            <a:schemeClr val="accent1"/>
+          </a:fillRef>
+          <a:effectRef idx="0">
+            <a:schemeClr val="accent1"/>
+          </a:effectRef>
+          <a:fontRef idx="minor">
+            <a:schemeClr val="tx1"/>
+          </a:fontRef>
+        </p:style>
+      </p:cxnSp>
+      <p:grpSp>
+        <p:nvGrpSpPr>
+          <p:cNvPr id="122" name="Group 121">
+            <a:extLst>
+              <a:ext uri="{FF2B5EF4-FFF2-40B4-BE49-F238E27FC236}">
+                <a16:creationId xmlns:a16="http://schemas.microsoft.com/office/drawing/2014/main" id="{767C5333-8DF8-44F4-8E05-6F0D5E2B69D8}"/>
+              </a:ext>
+            </a:extLst>
+          </p:cNvPr>
+          <p:cNvGrpSpPr/>
+          <p:nvPr/>
+        </p:nvGrpSpPr>
+        <p:grpSpPr>
+          <a:xfrm>
+            <a:off x="714435" y="5906369"/>
+            <a:ext cx="1969668" cy="499735"/>
+            <a:chOff x="4439652" y="264154"/>
+            <a:chExt cx="1969668" cy="499735"/>
+          </a:xfrm>
+        </p:grpSpPr>
+        <p:pic>
+          <p:nvPicPr>
+            <p:cNvPr id="124" name="Picture 123">
+              <a:extLst>
+                <a:ext uri="{FF2B5EF4-FFF2-40B4-BE49-F238E27FC236}">
+                  <a16:creationId xmlns:a16="http://schemas.microsoft.com/office/drawing/2014/main" id="{689ECDA9-2CDF-4646-9C04-21226FC971A3}"/>
+                </a:ext>
+              </a:extLst>
+            </p:cNvPr>
+            <p:cNvPicPr>
+              <a:picLocks noChangeAspect="1"/>
+            </p:cNvPicPr>
+            <p:nvPr/>
+          </p:nvPicPr>
+          <p:blipFill>
+            <a:blip r:embed="rId12">
+              <a:extLst>
+                <a:ext uri="{28A0092B-C50C-407E-A947-70E740481C1C}">
+                  <a14:useLocalDpi xmlns:a14="http://schemas.microsoft.com/office/drawing/2010/main" val="0"/>
+                </a:ext>
+              </a:extLst>
+            </a:blip>
+            <a:stretch>
+              <a:fillRect/>
+            </a:stretch>
+          </p:blipFill>
+          <p:spPr>
+            <a:xfrm>
+              <a:off x="4439652" y="264154"/>
+              <a:ext cx="476250" cy="476250"/>
+            </a:xfrm>
+            <a:prstGeom prst="rect">
+              <a:avLst/>
+            </a:prstGeom>
+          </p:spPr>
+        </p:pic>
+        <p:sp>
+          <p:nvSpPr>
+            <p:cNvPr id="125" name="TextBox 124">
+              <a:extLst>
+                <a:ext uri="{FF2B5EF4-FFF2-40B4-BE49-F238E27FC236}">
+                  <a16:creationId xmlns:a16="http://schemas.microsoft.com/office/drawing/2014/main" id="{911FD414-0D63-463F-A69A-DFF3136BC36D}"/>
+                </a:ext>
+              </a:extLst>
+            </p:cNvPr>
+            <p:cNvSpPr txBox="1"/>
+            <p:nvPr/>
+          </p:nvSpPr>
+          <p:spPr>
+            <a:xfrm>
+              <a:off x="4888795" y="317613"/>
+              <a:ext cx="1520525" cy="446276"/>
+            </a:xfrm>
+            <a:prstGeom prst="rect">
+              <a:avLst/>
+            </a:prstGeom>
+            <a:noFill/>
+          </p:spPr>
+          <p:txBody>
+            <a:bodyPr wrap="square" rtlCol="0">
+              <a:spAutoFit/>
+            </a:bodyPr>
+            <a:lstStyle/>
+            <a:p>
+              <a:pPr lvl="0">
+                <a:defRPr/>
+              </a:pPr>
+              <a:r>
+                <a:rPr kumimoji="0" lang="en-US" sz="900" b="1" i="0" u="none" strike="noStrike" kern="1200" cap="none" spc="0" normalizeH="0" baseline="0" noProof="0" dirty="0">
+                  <a:ln>
+                    <a:noFill/>
+                  </a:ln>
+                  <a:solidFill>
+                    <a:prstClr val="black"/>
+                  </a:solidFill>
+                  <a:effectLst/>
+                  <a:uLnTx/>
+                  <a:uFillTx/>
+                  <a:latin typeface="Segoe UI" panose="020B0502040204020203" pitchFamily="34" charset="0"/>
+                  <a:ea typeface="+mn-ea"/>
+                  <a:cs typeface="Segoe UI" panose="020B0502040204020203" pitchFamily="34" charset="0"/>
+                </a:rPr>
+                <a:t>SSL Certificate</a:t>
+              </a:r>
+            </a:p>
+            <a:p>
+              <a:pPr lvl="0">
+                <a:defRPr/>
+              </a:pPr>
+              <a:r>
+                <a:rPr lang="en-US" sz="700" dirty="0">
+                  <a:solidFill>
+                    <a:prstClr val="black"/>
+                  </a:solidFill>
+                  <a:latin typeface="Segoe UI" panose="020B0502040204020203" pitchFamily="34" charset="0"/>
+                  <a:cs typeface="Segoe UI" panose="020B0502040204020203" pitchFamily="34" charset="0"/>
+                </a:rPr>
+                <a:t>Subject=app1.domain.com</a:t>
+              </a:r>
+              <a:br>
+                <a:rPr lang="en-US" sz="700" dirty="0">
+                  <a:solidFill>
+                    <a:prstClr val="black"/>
+                  </a:solidFill>
+                  <a:latin typeface="Segoe UI" panose="020B0502040204020203" pitchFamily="34" charset="0"/>
+                  <a:cs typeface="Segoe UI" panose="020B0502040204020203" pitchFamily="34" charset="0"/>
+                </a:rPr>
+              </a:br>
+              <a:r>
+                <a:rPr lang="en-US" sz="700" dirty="0">
+                  <a:solidFill>
+                    <a:prstClr val="black"/>
+                  </a:solidFill>
+                  <a:latin typeface="Segoe UI" panose="020B0502040204020203" pitchFamily="34" charset="0"/>
+                  <a:cs typeface="Segoe UI" panose="020B0502040204020203" pitchFamily="34" charset="0"/>
+                </a:rPr>
+                <a:t>SAN=app1.scm.domain.com</a:t>
+              </a:r>
+            </a:p>
+          </p:txBody>
+        </p:sp>
+      </p:grpSp>
+      <p:sp>
+        <p:nvSpPr>
+          <p:cNvPr id="4" name="Rectangle 3">
+            <a:extLst>
+              <a:ext uri="{FF2B5EF4-FFF2-40B4-BE49-F238E27FC236}">
+                <a16:creationId xmlns:a16="http://schemas.microsoft.com/office/drawing/2014/main" id="{DD9F8168-7D64-41F5-951F-472E628E6367}"/>
+              </a:ext>
+            </a:extLst>
+          </p:cNvPr>
+          <p:cNvSpPr/>
+          <p:nvPr/>
+        </p:nvSpPr>
+        <p:spPr>
+          <a:xfrm>
+            <a:off x="6223304" y="4970130"/>
+            <a:ext cx="4070724" cy="1985159"/>
+          </a:xfrm>
+          <a:prstGeom prst="rect">
+            <a:avLst/>
+          </a:prstGeom>
+          <a:solidFill>
+            <a:srgbClr val="C8E987"/>
+          </a:solidFill>
+          <a:ln w="57150">
+            <a:solidFill>
+              <a:srgbClr val="7DBA00"/>
+            </a:solidFill>
+          </a:ln>
+        </p:spPr>
+        <p:txBody>
+          <a:bodyPr wrap="square" lIns="91440" tIns="91440" bIns="91440" numCol="1" anchor="ctr" anchorCtr="0">
+            <a:spAutoFit/>
+          </a:bodyPr>
+          <a:lstStyle/>
+          <a:p>
+            <a:r>
+              <a:rPr lang="en-US" sz="900" b="1" dirty="0">
+                <a:latin typeface="Calibri" panose="020F0502020204030204" pitchFamily="34" charset="0"/>
+                <a:ea typeface="Calibri" panose="020F0502020204030204" pitchFamily="34" charset="0"/>
+              </a:rPr>
+              <a:t>Multi-site listener:</a:t>
+            </a:r>
+            <a:br>
+              <a:rPr lang="en-US" sz="900" b="1" dirty="0">
+                <a:latin typeface="Calibri" panose="020F0502020204030204" pitchFamily="34" charset="0"/>
+                <a:ea typeface="Calibri" panose="020F0502020204030204" pitchFamily="34" charset="0"/>
+              </a:rPr>
+            </a:br>
+            <a:r>
+              <a:rPr lang="en-US" sz="900" b="1" dirty="0">
+                <a:latin typeface="Calibri" panose="020F0502020204030204" pitchFamily="34" charset="0"/>
+                <a:ea typeface="Calibri" panose="020F0502020204030204" pitchFamily="34" charset="0"/>
+              </a:rPr>
+              <a:t>app1.domain.com </a:t>
+            </a:r>
+            <a:r>
+              <a:rPr lang="en-US" sz="900" dirty="0">
+                <a:latin typeface="Calibri" panose="020F0502020204030204" pitchFamily="34" charset="0"/>
+                <a:ea typeface="Calibri" panose="020F0502020204030204" pitchFamily="34" charset="0"/>
+              </a:rPr>
+              <a:t>with </a:t>
+            </a:r>
+            <a:r>
+              <a:rPr lang="en-US" sz="900" dirty="0">
+                <a:latin typeface="Calibri" panose="020F0502020204030204" pitchFamily="34" charset="0"/>
+                <a:ea typeface="Calibri" panose="020F0502020204030204" pitchFamily="34" charset="0"/>
+                <a:cs typeface="Arial" panose="020B0604020202020204" pitchFamily="34" charset="0"/>
+              </a:rPr>
+              <a:t>SSL certificate </a:t>
+            </a:r>
+            <a:r>
+              <a:rPr lang="en-US" sz="900" b="1" dirty="0">
+                <a:latin typeface="Calibri" panose="020F0502020204030204" pitchFamily="34" charset="0"/>
+                <a:ea typeface="Calibri" panose="020F0502020204030204" pitchFamily="34" charset="0"/>
+                <a:cs typeface="Arial" panose="020B0604020202020204" pitchFamily="34" charset="0"/>
+              </a:rPr>
+              <a:t>(Subject=app1.domain.com)</a:t>
+            </a:r>
+            <a:br>
+              <a:rPr lang="en-US" sz="900" b="1" dirty="0">
+                <a:latin typeface="Calibri" panose="020F0502020204030204" pitchFamily="34" charset="0"/>
+                <a:ea typeface="Calibri" panose="020F0502020204030204" pitchFamily="34" charset="0"/>
+                <a:cs typeface="Arial" panose="020B0604020202020204" pitchFamily="34" charset="0"/>
+              </a:rPr>
+            </a:br>
+            <a:endParaRPr lang="en-US" sz="900" dirty="0">
+              <a:latin typeface="Calibri" panose="020F0502020204030204" pitchFamily="34" charset="0"/>
+              <a:ea typeface="Calibri" panose="020F0502020204030204" pitchFamily="34" charset="0"/>
+            </a:endParaRPr>
+          </a:p>
+          <a:p>
+            <a:r>
+              <a:rPr lang="en-US" sz="900" b="1" dirty="0">
+                <a:latin typeface="Calibri" panose="020F0502020204030204" pitchFamily="34" charset="0"/>
+                <a:ea typeface="Calibri" panose="020F0502020204030204" pitchFamily="34" charset="0"/>
+              </a:rPr>
+              <a:t>Backend Pool:</a:t>
+            </a:r>
+            <a:br>
+              <a:rPr lang="en-US" sz="900" b="1" dirty="0">
+                <a:latin typeface="Calibri" panose="020F0502020204030204" pitchFamily="34" charset="0"/>
+                <a:ea typeface="Calibri" panose="020F0502020204030204" pitchFamily="34" charset="0"/>
+              </a:rPr>
+            </a:br>
+            <a:r>
+              <a:rPr lang="en-US" sz="900" dirty="0">
+                <a:latin typeface="Calibri" panose="020F0502020204030204" pitchFamily="34" charset="0"/>
+                <a:ea typeface="Calibri" panose="020F0502020204030204" pitchFamily="34" charset="0"/>
+              </a:rPr>
+              <a:t>App Service Environment’s ILB IP</a:t>
+            </a:r>
+            <a:br>
+              <a:rPr lang="en-US" sz="900" dirty="0">
+                <a:latin typeface="Calibri" panose="020F0502020204030204" pitchFamily="34" charset="0"/>
+                <a:ea typeface="Calibri" panose="020F0502020204030204" pitchFamily="34" charset="0"/>
+              </a:rPr>
+            </a:br>
+            <a:endParaRPr lang="en-US" sz="900" dirty="0">
+              <a:latin typeface="Calibri" panose="020F0502020204030204" pitchFamily="34" charset="0"/>
+              <a:ea typeface="Calibri" panose="020F0502020204030204" pitchFamily="34" charset="0"/>
+            </a:endParaRPr>
+          </a:p>
+          <a:p>
+            <a:r>
+              <a:rPr lang="en-US" sz="900" b="1" dirty="0">
+                <a:latin typeface="Calibri" panose="020F0502020204030204" pitchFamily="34" charset="0"/>
+                <a:ea typeface="Calibri" panose="020F0502020204030204" pitchFamily="34" charset="0"/>
+              </a:rPr>
+              <a:t>Http Setting:</a:t>
+            </a:r>
+            <a:br>
+              <a:rPr lang="en-US" sz="900" b="1" dirty="0">
+                <a:latin typeface="Calibri" panose="020F0502020204030204" pitchFamily="34" charset="0"/>
+                <a:ea typeface="Calibri" panose="020F0502020204030204" pitchFamily="34" charset="0"/>
+              </a:rPr>
+            </a:br>
+            <a:r>
+              <a:rPr lang="en-US" sz="900" dirty="0">
+                <a:latin typeface="Calibri" panose="020F0502020204030204" pitchFamily="34" charset="0"/>
+                <a:ea typeface="Calibri" panose="020F0502020204030204" pitchFamily="34" charset="0"/>
+              </a:rPr>
+              <a:t>For HTTPS, using ASE ILB’s public certificate component for backend authentication </a:t>
+            </a:r>
+            <a:r>
+              <a:rPr lang="en-US" sz="900" b="1" dirty="0">
+                <a:latin typeface="Calibri" panose="020F0502020204030204" pitchFamily="34" charset="0"/>
+                <a:ea typeface="Calibri" panose="020F0502020204030204" pitchFamily="34" charset="0"/>
+              </a:rPr>
+              <a:t>(</a:t>
+            </a:r>
+            <a:r>
+              <a:rPr lang="en-US" sz="900" b="1" dirty="0">
+                <a:latin typeface="Calibri" panose="020F0502020204030204" pitchFamily="34" charset="0"/>
+                <a:ea typeface="Calibri" panose="020F0502020204030204" pitchFamily="34" charset="0"/>
+                <a:cs typeface="Arial" panose="020B0604020202020204" pitchFamily="34" charset="0"/>
+              </a:rPr>
+              <a:t>Subject=*.internal.domain.com and SAN=*.scm.internal.domain.com</a:t>
+            </a:r>
+            <a:r>
+              <a:rPr lang="en-US" sz="900" b="1" dirty="0">
+                <a:latin typeface="Calibri" panose="020F0502020204030204" pitchFamily="34" charset="0"/>
+                <a:ea typeface="Calibri" panose="020F0502020204030204" pitchFamily="34" charset="0"/>
+              </a:rPr>
+              <a:t>)</a:t>
+            </a:r>
+            <a:br>
+              <a:rPr lang="en-US" sz="900" b="1" dirty="0">
+                <a:latin typeface="Calibri" panose="020F0502020204030204" pitchFamily="34" charset="0"/>
+                <a:ea typeface="Calibri" panose="020F0502020204030204" pitchFamily="34" charset="0"/>
+              </a:rPr>
+            </a:br>
+            <a:endParaRPr lang="en-US" sz="900" b="1" dirty="0">
+              <a:latin typeface="Calibri" panose="020F0502020204030204" pitchFamily="34" charset="0"/>
+              <a:ea typeface="Calibri" panose="020F0502020204030204" pitchFamily="34" charset="0"/>
+            </a:endParaRPr>
+          </a:p>
+          <a:p>
+            <a:r>
+              <a:rPr lang="en-US" sz="900" b="1" dirty="0">
+                <a:latin typeface="Calibri" panose="020F0502020204030204" pitchFamily="34" charset="0"/>
+                <a:ea typeface="Calibri" panose="020F0502020204030204" pitchFamily="34" charset="0"/>
+              </a:rPr>
+              <a:t>Probes:</a:t>
+            </a:r>
+            <a:r>
+              <a:rPr lang="en-US" sz="900" dirty="0">
+                <a:latin typeface="Calibri" panose="020F0502020204030204" pitchFamily="34" charset="0"/>
+                <a:ea typeface="Calibri" panose="020F0502020204030204" pitchFamily="34" charset="0"/>
+              </a:rPr>
+              <a:t> </a:t>
+            </a:r>
+            <a:br>
+              <a:rPr lang="en-US" sz="900" dirty="0">
+                <a:latin typeface="Calibri" panose="020F0502020204030204" pitchFamily="34" charset="0"/>
+                <a:ea typeface="Calibri" panose="020F0502020204030204" pitchFamily="34" charset="0"/>
+              </a:rPr>
+            </a:br>
+            <a:r>
+              <a:rPr lang="en-US" sz="900" dirty="0">
+                <a:latin typeface="Calibri" panose="020F0502020204030204" pitchFamily="34" charset="0"/>
+                <a:ea typeface="Calibri" panose="020F0502020204030204" pitchFamily="34" charset="0"/>
+              </a:rPr>
+              <a:t>Custom probe to the Web App’s </a:t>
+            </a:r>
+            <a:r>
+              <a:rPr lang="en-US" sz="900" u="sng" dirty="0">
+                <a:latin typeface="Calibri" panose="020F0502020204030204" pitchFamily="34" charset="0"/>
+                <a:ea typeface="Calibri" panose="020F0502020204030204" pitchFamily="34" charset="0"/>
+              </a:rPr>
+              <a:t>internal</a:t>
+            </a:r>
+            <a:r>
+              <a:rPr lang="en-US" sz="900" dirty="0">
+                <a:latin typeface="Calibri" panose="020F0502020204030204" pitchFamily="34" charset="0"/>
+                <a:ea typeface="Calibri" panose="020F0502020204030204" pitchFamily="34" charset="0"/>
+              </a:rPr>
+              <a:t> ASE hostname </a:t>
+            </a:r>
+            <a:br>
+              <a:rPr lang="en-US" sz="900" b="1" dirty="0">
+                <a:latin typeface="Calibri" panose="020F0502020204030204" pitchFamily="34" charset="0"/>
+                <a:ea typeface="Calibri" panose="020F0502020204030204" pitchFamily="34" charset="0"/>
+              </a:rPr>
+            </a:br>
+            <a:r>
+              <a:rPr lang="en-US" sz="900" b="1" dirty="0">
+                <a:latin typeface="Calibri" panose="020F0502020204030204" pitchFamily="34" charset="0"/>
+                <a:ea typeface="Calibri" panose="020F0502020204030204" pitchFamily="34" charset="0"/>
+              </a:rPr>
+              <a:t>app1.internal.domain.com</a:t>
+            </a:r>
+            <a:r>
+              <a:rPr lang="en-US" sz="900" dirty="0">
+                <a:latin typeface="Calibri" panose="020F0502020204030204" pitchFamily="34" charset="0"/>
+                <a:ea typeface="Calibri" panose="020F0502020204030204" pitchFamily="34" charset="0"/>
+              </a:rPr>
+              <a:t> and using the </a:t>
+            </a:r>
+            <a:r>
+              <a:rPr lang="en-US" sz="900" b="1" dirty="0">
+                <a:latin typeface="Calibri" panose="020F0502020204030204" pitchFamily="34" charset="0"/>
+                <a:ea typeface="Calibri" panose="020F0502020204030204" pitchFamily="34" charset="0"/>
+              </a:rPr>
+              <a:t>Http Setting </a:t>
+            </a:r>
+            <a:r>
+              <a:rPr lang="en-US" sz="900" dirty="0">
+                <a:latin typeface="Calibri" panose="020F0502020204030204" pitchFamily="34" charset="0"/>
+                <a:ea typeface="Calibri" panose="020F0502020204030204" pitchFamily="34" charset="0"/>
+              </a:rPr>
+              <a:t>defined above</a:t>
+            </a:r>
+            <a:endParaRPr lang="en-US" sz="900" dirty="0">
+              <a:effectLst/>
+              <a:latin typeface="Calibri" panose="020F0502020204030204" pitchFamily="34" charset="0"/>
+              <a:ea typeface="Calibri" panose="020F0502020204030204" pitchFamily="34" charset="0"/>
+            </a:endParaRPr>
+          </a:p>
+        </p:txBody>
+      </p:sp>
+      <p:cxnSp>
+        <p:nvCxnSpPr>
+          <p:cNvPr id="6" name="Straight Arrow Connector 5">
+            <a:extLst>
+              <a:ext uri="{FF2B5EF4-FFF2-40B4-BE49-F238E27FC236}">
+                <a16:creationId xmlns:a16="http://schemas.microsoft.com/office/drawing/2014/main" id="{A279AE7E-9242-40F0-8117-879862B15FF2}"/>
+              </a:ext>
+            </a:extLst>
+          </p:cNvPr>
+          <p:cNvCxnSpPr/>
+          <p:nvPr/>
+        </p:nvCxnSpPr>
+        <p:spPr>
+          <a:xfrm flipV="1">
+            <a:off x="4508347" y="6566566"/>
+            <a:ext cx="1602169" cy="255190"/>
+          </a:xfrm>
+          <a:prstGeom prst="bentConnector3">
+            <a:avLst>
+              <a:gd name="adj1" fmla="val 1298"/>
+            </a:avLst>
+          </a:prstGeom>
+          <a:ln w="38100">
+            <a:solidFill>
+              <a:srgbClr val="7DBA00"/>
+            </a:solidFill>
+            <a:headEnd type="none" w="med" len="med"/>
+            <a:tailEnd type="triangle" w="med" len="med"/>
           </a:ln>
         </p:spPr>
         <p:style>

</xml_diff>